<commit_message>
actuzalicación lectura sugerida semana 5
</commit_message>
<xml_diff>
--- a/Semana_1/Tìtulo.pptx
+++ b/Semana_1/Tìtulo.pptx
@@ -181,7 +181,7 @@
 <file path=ppt/revisionInfo.xml><?xml version="1.0" encoding="utf-8"?>
 <p1510:revInfo xmlns:a="http://schemas.openxmlformats.org/drawingml/2006/main" xmlns:r="http://schemas.openxmlformats.org/officeDocument/2006/relationships" xmlns:p1510="http://schemas.microsoft.com/office/powerpoint/2015/10/main">
   <p1510:revLst>
-    <p1510:client id="{D74B6004-55D4-41AA-AFCD-F807B86D6638}" v="7" dt="2025-01-23T02:15:42.111"/>
+    <p1510:client id="{D74B6004-55D4-41AA-AFCD-F807B86D6638}" v="8" dt="2025-01-23T14:14:53.156"/>
   </p1510:revLst>
 </p1510:revInfo>
 </file>
@@ -763,16 +763,24 @@
   <pc:docChgLst>
     <pc:chgData name="JHEYSON FABIAN VILLAVISAN BUITRAGO" userId="e5ced5c2-d787-455d-b115-4f08a699b8c8" providerId="ADAL" clId="{D74B6004-55D4-41AA-AFCD-F807B86D6638}"/>
     <pc:docChg chg="addSld delSld modSld modSection">
-      <pc:chgData name="JHEYSON FABIAN VILLAVISAN BUITRAGO" userId="e5ced5c2-d787-455d-b115-4f08a699b8c8" providerId="ADAL" clId="{D74B6004-55D4-41AA-AFCD-F807B86D6638}" dt="2025-01-23T02:21:41.042" v="23" actId="20577"/>
+      <pc:chgData name="JHEYSON FABIAN VILLAVISAN BUITRAGO" userId="e5ced5c2-d787-455d-b115-4f08a699b8c8" providerId="ADAL" clId="{D74B6004-55D4-41AA-AFCD-F807B86D6638}" dt="2025-01-23T14:14:55.610" v="28" actId="20577"/>
       <pc:docMkLst>
         <pc:docMk/>
       </pc:docMkLst>
-      <pc:sldChg chg="addSp modSp">
-        <pc:chgData name="JHEYSON FABIAN VILLAVISAN BUITRAGO" userId="e5ced5c2-d787-455d-b115-4f08a699b8c8" providerId="ADAL" clId="{D74B6004-55D4-41AA-AFCD-F807B86D6638}" dt="2025-01-23T02:15:37.741" v="3"/>
+      <pc:sldChg chg="addSp modSp mod">
+        <pc:chgData name="JHEYSON FABIAN VILLAVISAN BUITRAGO" userId="e5ced5c2-d787-455d-b115-4f08a699b8c8" providerId="ADAL" clId="{D74B6004-55D4-41AA-AFCD-F807B86D6638}" dt="2025-01-23T14:14:55.610" v="28" actId="20577"/>
         <pc:sldMkLst>
           <pc:docMk/>
           <pc:sldMk cId="0" sldId="256"/>
         </pc:sldMkLst>
+        <pc:spChg chg="add mod">
+          <ac:chgData name="JHEYSON FABIAN VILLAVISAN BUITRAGO" userId="e5ced5c2-d787-455d-b115-4f08a699b8c8" providerId="ADAL" clId="{D74B6004-55D4-41AA-AFCD-F807B86D6638}" dt="2025-01-23T14:14:55.610" v="28" actId="20577"/>
+          <ac:spMkLst>
+            <pc:docMk/>
+            <pc:sldMk cId="0" sldId="256"/>
+            <ac:spMk id="2" creationId="{E81AC960-3A16-8528-CAB4-9444D9D19107}"/>
+          </ac:spMkLst>
+        </pc:spChg>
         <pc:graphicFrameChg chg="add mod">
           <ac:chgData name="JHEYSON FABIAN VILLAVISAN BUITRAGO" userId="e5ced5c2-d787-455d-b115-4f08a699b8c8" providerId="ADAL" clId="{D74B6004-55D4-41AA-AFCD-F807B86D6638}" dt="2025-01-23T02:15:29.544" v="1"/>
           <ac:graphicFrameMkLst>
@@ -979,13 +987,13 @@
         </pc:spChg>
       </pc:sldChg>
       <pc:sldChg chg="modSp mod">
-        <pc:chgData name="JHEYSON FABIAN VILLAVISAN BUITRAGO" userId="e5ced5c2-d787-455d-b115-4f08a699b8c8" providerId="ADAL" clId="{D74B6004-55D4-41AA-AFCD-F807B86D6638}" dt="2025-01-23T02:21:41.042" v="23" actId="20577"/>
+        <pc:chgData name="JHEYSON FABIAN VILLAVISAN BUITRAGO" userId="e5ced5c2-d787-455d-b115-4f08a699b8c8" providerId="ADAL" clId="{D74B6004-55D4-41AA-AFCD-F807B86D6638}" dt="2025-01-23T14:12:18.986" v="24" actId="20577"/>
         <pc:sldMkLst>
           <pc:docMk/>
           <pc:sldMk cId="597048695" sldId="285"/>
         </pc:sldMkLst>
         <pc:spChg chg="mod">
-          <ac:chgData name="JHEYSON FABIAN VILLAVISAN BUITRAGO" userId="e5ced5c2-d787-455d-b115-4f08a699b8c8" providerId="ADAL" clId="{D74B6004-55D4-41AA-AFCD-F807B86D6638}" dt="2025-01-23T02:21:41.042" v="23" actId="20577"/>
+          <ac:chgData name="JHEYSON FABIAN VILLAVISAN BUITRAGO" userId="e5ced5c2-d787-455d-b115-4f08a699b8c8" providerId="ADAL" clId="{D74B6004-55D4-41AA-AFCD-F807B86D6638}" dt="2025-01-23T14:12:18.986" v="24" actId="20577"/>
           <ac:spMkLst>
             <pc:docMk/>
             <pc:sldMk cId="597048695" sldId="285"/>
@@ -1137,7 +1145,7 @@
               <a:pPr>
                 <a:defRPr/>
               </a:pPr>
-              <a:t>22/01/2025</a:t>
+              <a:t>23/01/2025</a:t>
             </a:fld>
             <a:endParaRPr lang="es-CO"/>
           </a:p>
@@ -1380,7 +1388,7 @@
               <a:pPr>
                 <a:defRPr/>
               </a:pPr>
-              <a:t>22/01/2025</a:t>
+              <a:t>23/01/2025</a:t>
             </a:fld>
             <a:endParaRPr lang="es-CO"/>
           </a:p>
@@ -5235,7 +5243,7 @@
           <a:p>
             <a:fld id="{9CF7635E-2D71-42E7-9E6C-FBB85A15A85F}" type="datetimeFigureOut">
               <a:rPr lang="es-CO" smtClean="0"/>
-              <a:t>22/01/2025</a:t>
+              <a:t>23/01/2025</a:t>
             </a:fld>
             <a:endParaRPr lang="es-CO"/>
           </a:p>
@@ -5501,7 +5509,7 @@
           <a:p>
             <a:fld id="{9CF7635E-2D71-42E7-9E6C-FBB85A15A85F}" type="datetimeFigureOut">
               <a:rPr lang="es-CO" smtClean="0"/>
-              <a:t>22/01/2025</a:t>
+              <a:t>23/01/2025</a:t>
             </a:fld>
             <a:endParaRPr lang="es-CO"/>
           </a:p>
@@ -5717,7 +5725,7 @@
           <a:p>
             <a:fld id="{9CF7635E-2D71-42E7-9E6C-FBB85A15A85F}" type="datetimeFigureOut">
               <a:rPr lang="es-CO" smtClean="0"/>
-              <a:t>22/01/2025</a:t>
+              <a:t>23/01/2025</a:t>
             </a:fld>
             <a:endParaRPr lang="es-CO"/>
           </a:p>
@@ -7346,7 +7354,7 @@
           <a:p>
             <a:fld id="{9CF7635E-2D71-42E7-9E6C-FBB85A15A85F}" type="datetimeFigureOut">
               <a:rPr lang="es-CO" smtClean="0"/>
-              <a:t>22/01/2025</a:t>
+              <a:t>23/01/2025</a:t>
             </a:fld>
             <a:endParaRPr lang="es-CO"/>
           </a:p>
@@ -7793,7 +7801,7 @@
           <a:p>
             <a:fld id="{9CF7635E-2D71-42E7-9E6C-FBB85A15A85F}" type="datetimeFigureOut">
               <a:rPr lang="es-CO" smtClean="0"/>
-              <a:t>22/01/2025</a:t>
+              <a:t>23/01/2025</a:t>
             </a:fld>
             <a:endParaRPr lang="es-CO"/>
           </a:p>
@@ -8067,7 +8075,7 @@
           <a:p>
             <a:fld id="{9CF7635E-2D71-42E7-9E6C-FBB85A15A85F}" type="datetimeFigureOut">
               <a:rPr lang="es-CO" smtClean="0"/>
-              <a:t>22/01/2025</a:t>
+              <a:t>23/01/2025</a:t>
             </a:fld>
             <a:endParaRPr lang="es-CO"/>
           </a:p>
@@ -8488,7 +8496,7 @@
           <a:p>
             <a:fld id="{9CF7635E-2D71-42E7-9E6C-FBB85A15A85F}" type="datetimeFigureOut">
               <a:rPr lang="es-CO" smtClean="0"/>
-              <a:t>22/01/2025</a:t>
+              <a:t>23/01/2025</a:t>
             </a:fld>
             <a:endParaRPr lang="es-CO"/>
           </a:p>
@@ -8636,7 +8644,7 @@
           <a:p>
             <a:fld id="{9CF7635E-2D71-42E7-9E6C-FBB85A15A85F}" type="datetimeFigureOut">
               <a:rPr lang="es-CO" smtClean="0"/>
-              <a:t>22/01/2025</a:t>
+              <a:t>23/01/2025</a:t>
             </a:fld>
             <a:endParaRPr lang="es-CO"/>
           </a:p>
@@ -8755,7 +8763,7 @@
           <a:p>
             <a:fld id="{9CF7635E-2D71-42E7-9E6C-FBB85A15A85F}" type="datetimeFigureOut">
               <a:rPr lang="es-CO" smtClean="0"/>
-              <a:t>22/01/2025</a:t>
+              <a:t>23/01/2025</a:t>
             </a:fld>
             <a:endParaRPr lang="es-CO"/>
           </a:p>
@@ -9074,7 +9082,7 @@
           <a:p>
             <a:fld id="{9CF7635E-2D71-42E7-9E6C-FBB85A15A85F}" type="datetimeFigureOut">
               <a:rPr lang="es-CO" smtClean="0"/>
-              <a:t>22/01/2025</a:t>
+              <a:t>23/01/2025</a:t>
             </a:fld>
             <a:endParaRPr lang="es-CO"/>
           </a:p>
@@ -9369,7 +9377,7 @@
           <a:p>
             <a:fld id="{9CF7635E-2D71-42E7-9E6C-FBB85A15A85F}" type="datetimeFigureOut">
               <a:rPr lang="es-CO" smtClean="0"/>
-              <a:t>22/01/2025</a:t>
+              <a:t>23/01/2025</a:t>
             </a:fld>
             <a:endParaRPr lang="es-CO"/>
           </a:p>
@@ -9618,7 +9626,7 @@
           <a:p>
             <a:fld id="{9CF7635E-2D71-42E7-9E6C-FBB85A15A85F}" type="datetimeFigureOut">
               <a:rPr lang="es-CO" smtClean="0"/>
-              <a:t>22/01/2025</a:t>
+              <a:t>23/01/2025</a:t>
             </a:fld>
             <a:endParaRPr lang="es-CO"/>
           </a:p>
@@ -10614,6 +10622,40 @@
           </a:extLst>
         </p:spPr>
       </p:pic>
+      <p:sp>
+        <p:nvSpPr>
+          <p:cNvPr id="2" name="1 Título">
+            <a:extLst>
+              <a:ext uri="{FF2B5EF4-FFF2-40B4-BE49-F238E27FC236}">
+                <a16:creationId xmlns:a16="http://schemas.microsoft.com/office/drawing/2014/main" id="{E81AC960-3A16-8528-CAB4-9444D9D19107}"/>
+              </a:ext>
+            </a:extLst>
+          </p:cNvPr>
+          <p:cNvSpPr>
+            <a:spLocks noGrp="1"/>
+          </p:cNvSpPr>
+          <p:nvPr>
+            <p:ph type="ctrTitle"/>
+          </p:nvPr>
+        </p:nvSpPr>
+        <p:spPr>
+          <a:xfrm>
+            <a:off x="0" y="-28575"/>
+            <a:ext cx="779463" cy="720725"/>
+          </a:xfrm>
+        </p:spPr>
+        <p:txBody>
+          <a:bodyPr/>
+          <a:lstStyle/>
+          <a:p>
+            <a:pPr algn="ctr" eaLnBrk="1" hangingPunct="1"/>
+            <a:r>
+              <a:rPr lang="es-CO" altLang="es-CO" sz="3600" dirty="0"/>
+              <a:t>1</a:t>
+            </a:r>
+          </a:p>
+        </p:txBody>
+      </p:sp>
     </p:spTree>
   </p:cSld>
   <p:clrMapOvr>
@@ -14799,20 +14841,6 @@
               </a:rPr>
               <a:t>Contexto: es el entorno o la situación en la que se desarrolla la investigación.</a:t>
             </a:r>
-          </a:p>
-          <a:p>
-            <a:pPr marL="0" indent="0">
-              <a:buNone/>
-              <a:defRPr/>
-            </a:pPr>
-            <a:r>
-              <a:rPr lang="es-CO" sz="1800" dirty="0">
-                <a:latin typeface="Arial"/>
-                <a:cs typeface="Arial"/>
-              </a:rPr>
-              <a:t>Dificultad para desarrollar prácticas de diseño y fabricación de transformadores.</a:t>
-            </a:r>
-            <a:endParaRPr lang="es-CO" dirty="0"/>
           </a:p>
           <a:p>
             <a:pPr>
@@ -25952,15 +25980,6 @@
 </file>
 
 <file path=customXml/item1.xml><?xml version="1.0" encoding="utf-8"?>
-<?mso-contentType ?>
-<FormTemplates xmlns="http://schemas.microsoft.com/sharepoint/v3/contenttype/forms">
-  <Display>DocumentLibraryForm</Display>
-  <Edit>DocumentLibraryForm</Edit>
-  <New>DocumentLibraryForm</New>
-</FormTemplates>
-</file>
-
-<file path=customXml/item2.xml><?xml version="1.0" encoding="utf-8"?>
 <ct:contentTypeSchema xmlns:ct="http://schemas.microsoft.com/office/2006/metadata/contentType" xmlns:ma="http://schemas.microsoft.com/office/2006/metadata/properties/metaAttributes" ct:_="" ma:_="" ma:contentTypeName="Documento" ma:contentTypeID="0x0101007A62137D465CE64A8C883A4664514BF8" ma:contentTypeVersion="15" ma:contentTypeDescription="Crear nuevo documento." ma:contentTypeScope="" ma:versionID="a1bd1d59f691eb9bca6952b111268275">
   <xsd:schema xmlns:xsd="http://www.w3.org/2001/XMLSchema" xmlns:xs="http://www.w3.org/2001/XMLSchema" xmlns:p="http://schemas.microsoft.com/office/2006/metadata/properties" xmlns:ns3="669280c1-d17e-4d1d-bd7f-b4f14cc6bf1d" xmlns:ns4="bdc56f61-abc0-4f7e-bfec-a93ccd1ae886" targetNamespace="http://schemas.microsoft.com/office/2006/metadata/properties" ma:root="true" ma:fieldsID="d02990a02f19f0f9fc7b999b1809cae4" ns3:_="" ns4:_="">
     <xsd:import namespace="669280c1-d17e-4d1d-bd7f-b4f14cc6bf1d"/>
@@ -26195,6 +26214,15 @@
 </ct:contentTypeSchema>
 </file>
 
+<file path=customXml/item2.xml><?xml version="1.0" encoding="utf-8"?>
+<?mso-contentType ?>
+<FormTemplates xmlns="http://schemas.microsoft.com/sharepoint/v3/contenttype/forms">
+  <Display>DocumentLibraryForm</Display>
+  <Edit>DocumentLibraryForm</Edit>
+  <New>DocumentLibraryForm</New>
+</FormTemplates>
+</file>
+
 <file path=customXml/item3.xml><?xml version="1.0" encoding="utf-8"?>
 <p:properties xmlns:p="http://schemas.microsoft.com/office/2006/metadata/properties" xmlns:xsi="http://www.w3.org/2001/XMLSchema-instance" xmlns:pc="http://schemas.microsoft.com/office/infopath/2007/PartnerControls">
   <documentManagement>
@@ -26204,14 +26232,6 @@
 </file>
 
 <file path=customXml/itemProps1.xml><?xml version="1.0" encoding="utf-8"?>
-<ds:datastoreItem xmlns:ds="http://schemas.openxmlformats.org/officeDocument/2006/customXml" ds:itemID="{4E8623C8-32E1-48B0-9F0A-13F2E9582B7E}">
-  <ds:schemaRefs>
-    <ds:schemaRef ds:uri="http://schemas.microsoft.com/sharepoint/v3/contenttype/forms"/>
-  </ds:schemaRefs>
-</ds:datastoreItem>
-</file>
-
-<file path=customXml/itemProps2.xml><?xml version="1.0" encoding="utf-8"?>
 <ds:datastoreItem xmlns:ds="http://schemas.openxmlformats.org/officeDocument/2006/customXml" ds:itemID="{025820C3-FD82-4EFC-BF14-EAF1F9613F52}">
   <ds:schemaRefs>
     <ds:schemaRef ds:uri="http://schemas.microsoft.com/office/2006/metadata/contentType"/>
@@ -26226,6 +26246,14 @@
     <ds:schemaRef ds:uri="http://purl.org/dc/elements/1.1/"/>
     <ds:schemaRef ds:uri="http://purl.org/dc/terms/"/>
     <ds:schemaRef ds:uri="http://schemas.microsoft.com/internal/obd"/>
+  </ds:schemaRefs>
+</ds:datastoreItem>
+</file>
+
+<file path=customXml/itemProps2.xml><?xml version="1.0" encoding="utf-8"?>
+<ds:datastoreItem xmlns:ds="http://schemas.openxmlformats.org/officeDocument/2006/customXml" ds:itemID="{4E8623C8-32E1-48B0-9F0A-13F2E9582B7E}">
+  <ds:schemaRefs>
+    <ds:schemaRef ds:uri="http://schemas.microsoft.com/sharepoint/v3/contenttype/forms"/>
   </ds:schemaRefs>
 </ds:datastoreItem>
 </file>

</xml_diff>